<commit_message>
update Ui and change image limit to 5.
</commit_message>
<xml_diff>
--- a/PPImagePopulate/bin/Debug/Presentation1.pptx
+++ b/PPImagePopulate/bin/Debug/Presentation1.pptx
@@ -2,10 +2,10 @@
 <file path=ppt/presentation.xml><?xml version="1.0" encoding="utf-8"?>
 <p:presentation xmlns:a="http://schemas.openxmlformats.org/drawingml/2006/main" xmlns:r="http://schemas.openxmlformats.org/officeDocument/2006/relationships" xmlns:p="http://schemas.openxmlformats.org/presentationml/2006/main" saveSubsetFonts="1">
   <p:sldMasterIdLst>
-    <p:sldMasterId id="2147483648" r:id="Rdb873c3d61074811"/>
+    <p:sldMasterId id="2147483648" r:id="Rc85ffa4fe325497d"/>
   </p:sldMasterIdLst>
   <p:sldIdLst>
-    <p:sldId id="256" r:id="R70b45da937034e1f"/>
+    <p:sldId id="256" r:id="R9ab32cf418494e48"/>
   </p:sldIdLst>
   <p:sldSz cx="12192000" cy="6858000"/>
   <p:notesSz cx="6858000" cy="9144000"/>
@@ -2652,17 +2652,17 @@
   </p:cSld>
   <p:clrMap bg1="lt1" tx1="dk1" bg2="lt2" tx2="dk2" accent1="accent1" accent2="accent2" accent3="accent3" accent4="accent4" accent5="accent5" accent6="accent6" hlink="hlink" folHlink="folHlink"/>
   <p:sldLayoutIdLst>
-    <p:sldLayoutId id="2147483649" r:id="Rd0f603886ee8453b"/>
-    <p:sldLayoutId id="2147483650" r:id="R40eb101bf6c84176"/>
-    <p:sldLayoutId id="2147483651" r:id="Rd71978bca37e4e9f"/>
-    <p:sldLayoutId id="2147483652" r:id="R4f52f0cee9eb473d"/>
-    <p:sldLayoutId id="2147483653" r:id="Rce46c56f7f734ef6"/>
-    <p:sldLayoutId id="2147483654" r:id="R5a8b98227c994071"/>
-    <p:sldLayoutId id="2147483655" r:id="Rfa8da019f9bb4d44"/>
-    <p:sldLayoutId id="2147483656" r:id="Rca06230bd2b243f0"/>
-    <p:sldLayoutId id="2147483657" r:id="Rc078933d123646b1"/>
-    <p:sldLayoutId id="2147483658" r:id="R0220760e969542ee"/>
-    <p:sldLayoutId id="2147483659" r:id="Rde4ef9c41ba94644"/>
+    <p:sldLayoutId id="2147483649" r:id="Rb472e1d513154299"/>
+    <p:sldLayoutId id="2147483650" r:id="Rbe257038155041c2"/>
+    <p:sldLayoutId id="2147483651" r:id="Rabfc83b84ca24918"/>
+    <p:sldLayoutId id="2147483652" r:id="R220a5583dff847a4"/>
+    <p:sldLayoutId id="2147483653" r:id="Re19325011f2f42dd"/>
+    <p:sldLayoutId id="2147483654" r:id="R13a9c8c6ce3049b5"/>
+    <p:sldLayoutId id="2147483655" r:id="R6a56f19815484722"/>
+    <p:sldLayoutId id="2147483656" r:id="R98f69b4958d344cf"/>
+    <p:sldLayoutId id="2147483657" r:id="R8cb67b0cbe7c47f5"/>
+    <p:sldLayoutId id="2147483658" r:id="Rf42ec85c604148db"/>
+    <p:sldLayoutId id="2147483659" r:id="R4255169fe51b4a32"/>
   </p:sldLayoutIdLst>
   <p:txStyles>
     <p:titleStyle>
@@ -3279,13 +3279,13 @@
 <file path=ppt/webextensions/taskpanes.xml><?xml version="1.0" encoding="utf-8"?>
 <wetp:taskpanes xmlns:r="http://schemas.openxmlformats.org/officeDocument/2006/relationships" xmlns:wetp="http://schemas.microsoft.com/office/webextensions/taskpanes/2010/11">
   <wetp:taskpane dockstate="" visibility="1" width="350" row="1">
-    <wetp:webextensionref xmlns:r="http://schemas.openxmlformats.org/officeDocument/2006/relationships" r:id="R3033ee7f52a24941"/>
+    <wetp:webextensionref xmlns:r="http://schemas.openxmlformats.org/officeDocument/2006/relationships" r:id="Ra0cf6f6cd45a4557"/>
   </wetp:taskpane>
 </wetp:taskpanes>
 </file>
 
 <file path=ppt/webextensions/webextension.xml><?xml version="1.0" encoding="utf-8"?>
-<we:webextension xmlns:r="http://schemas.openxmlformats.org/officeDocument/2006/relationships" xmlns:we="http://schemas.microsoft.com/office/webextensions/webextension/2010/11" id="{e518b1f6-0e91-4b17-b2d3-f3324c76563f}">
+<we:webextension xmlns:r="http://schemas.openxmlformats.org/officeDocument/2006/relationships" xmlns:we="http://schemas.microsoft.com/office/webextensions/webextension/2010/11" id="{7f7833a6-42cd-4426-9c69-3a60e96bb550}">
   <we:reference id="b0c55b98-d1ca-4b5e-a8db-89dc84f0843b" version="1.0.0.0" store="developer" storeType="Registry"/>
   <we:alternateReferences/>
   <we:properties/>

</xml_diff>